<commit_message>
Finished adding the code to load the space skybox cube map
</commit_message>
<xml_diff>
--- a/Daily_Lectures/Day10 (textures, part 1)/INFO3111_S20_Day_10_Texture_mapping (code on last slide).pptx
+++ b/Daily_Lectures/Day10 (textures, part 1)/INFO3111_S20_Day_10_Texture_mapping (code on last slide).pptx
@@ -228,7 +228,7 @@
             <a:fld id="{6E28E25E-87BB-46EA-8F9E-473DAE89420C}" type="datetimeFigureOut">
               <a:rPr lang="en-CA" smtClean="0"/>
               <a:pPr/>
-              <a:t>2023-06-02</a:t>
+              <a:t>2023-06-08</a:t>
             </a:fld>
             <a:endParaRPr lang="en-CA"/>
           </a:p>
@@ -394,7 +394,7 @@
           <a:p>
             <a:fld id="{D61BC0C6-8165-4029-93EB-E0CF8A3883CE}" type="datetimeFigureOut">
               <a:rPr lang="en-CA" smtClean="0"/>
-              <a:t>2023-06-02</a:t>
+              <a:t>2023-06-08</a:t>
             </a:fld>
             <a:endParaRPr lang="en-CA"/>
           </a:p>
@@ -936,7 +936,7 @@
             <a:fld id="{667A62CB-8588-4D98-8E9E-C665A03A0EA4}" type="datetimeFigureOut">
               <a:rPr lang="en-CA" smtClean="0"/>
               <a:pPr/>
-              <a:t>2023-06-02</a:t>
+              <a:t>2023-06-08</a:t>
             </a:fld>
             <a:endParaRPr lang="en-CA"/>
           </a:p>
@@ -1103,7 +1103,7 @@
             <a:fld id="{667A62CB-8588-4D98-8E9E-C665A03A0EA4}" type="datetimeFigureOut">
               <a:rPr lang="en-CA" smtClean="0"/>
               <a:pPr/>
-              <a:t>2023-06-02</a:t>
+              <a:t>2023-06-08</a:t>
             </a:fld>
             <a:endParaRPr lang="en-CA"/>
           </a:p>
@@ -1280,7 +1280,7 @@
             <a:fld id="{667A62CB-8588-4D98-8E9E-C665A03A0EA4}" type="datetimeFigureOut">
               <a:rPr lang="en-CA" smtClean="0"/>
               <a:pPr/>
-              <a:t>2023-06-02</a:t>
+              <a:t>2023-06-08</a:t>
             </a:fld>
             <a:endParaRPr lang="en-CA"/>
           </a:p>
@@ -1447,7 +1447,7 @@
             <a:fld id="{667A62CB-8588-4D98-8E9E-C665A03A0EA4}" type="datetimeFigureOut">
               <a:rPr lang="en-CA" smtClean="0"/>
               <a:pPr/>
-              <a:t>2023-06-02</a:t>
+              <a:t>2023-06-08</a:t>
             </a:fld>
             <a:endParaRPr lang="en-CA"/>
           </a:p>
@@ -1690,7 +1690,7 @@
             <a:fld id="{667A62CB-8588-4D98-8E9E-C665A03A0EA4}" type="datetimeFigureOut">
               <a:rPr lang="en-CA" smtClean="0"/>
               <a:pPr/>
-              <a:t>2023-06-02</a:t>
+              <a:t>2023-06-08</a:t>
             </a:fld>
             <a:endParaRPr lang="en-CA"/>
           </a:p>
@@ -1975,7 +1975,7 @@
             <a:fld id="{667A62CB-8588-4D98-8E9E-C665A03A0EA4}" type="datetimeFigureOut">
               <a:rPr lang="en-CA" smtClean="0"/>
               <a:pPr/>
-              <a:t>2023-06-02</a:t>
+              <a:t>2023-06-08</a:t>
             </a:fld>
             <a:endParaRPr lang="en-CA"/>
           </a:p>
@@ -2394,7 +2394,7 @@
             <a:fld id="{667A62CB-8588-4D98-8E9E-C665A03A0EA4}" type="datetimeFigureOut">
               <a:rPr lang="en-CA" smtClean="0"/>
               <a:pPr/>
-              <a:t>2023-06-02</a:t>
+              <a:t>2023-06-08</a:t>
             </a:fld>
             <a:endParaRPr lang="en-CA"/>
           </a:p>
@@ -2509,7 +2509,7 @@
             <a:fld id="{667A62CB-8588-4D98-8E9E-C665A03A0EA4}" type="datetimeFigureOut">
               <a:rPr lang="en-CA" smtClean="0"/>
               <a:pPr/>
-              <a:t>2023-06-02</a:t>
+              <a:t>2023-06-08</a:t>
             </a:fld>
             <a:endParaRPr lang="en-CA"/>
           </a:p>
@@ -2601,7 +2601,7 @@
             <a:fld id="{667A62CB-8588-4D98-8E9E-C665A03A0EA4}" type="datetimeFigureOut">
               <a:rPr lang="en-CA" smtClean="0"/>
               <a:pPr/>
-              <a:t>2023-06-02</a:t>
+              <a:t>2023-06-08</a:t>
             </a:fld>
             <a:endParaRPr lang="en-CA"/>
           </a:p>
@@ -2875,7 +2875,7 @@
             <a:fld id="{667A62CB-8588-4D98-8E9E-C665A03A0EA4}" type="datetimeFigureOut">
               <a:rPr lang="en-CA" smtClean="0"/>
               <a:pPr/>
-              <a:t>2023-06-02</a:t>
+              <a:t>2023-06-08</a:t>
             </a:fld>
             <a:endParaRPr lang="en-CA"/>
           </a:p>
@@ -3125,7 +3125,7 @@
             <a:fld id="{667A62CB-8588-4D98-8E9E-C665A03A0EA4}" type="datetimeFigureOut">
               <a:rPr lang="en-CA" smtClean="0"/>
               <a:pPr/>
-              <a:t>2023-06-02</a:t>
+              <a:t>2023-06-08</a:t>
             </a:fld>
             <a:endParaRPr lang="en-CA"/>
           </a:p>
@@ -3335,7 +3335,7 @@
             <a:fld id="{667A62CB-8588-4D98-8E9E-C665A03A0EA4}" type="datetimeFigureOut">
               <a:rPr lang="en-CA" smtClean="0"/>
               <a:pPr/>
-              <a:t>2023-06-02</a:t>
+              <a:t>2023-06-08</a:t>
             </a:fld>
             <a:endParaRPr lang="en-CA"/>
           </a:p>
@@ -5409,42 +5409,6 @@
           </a:fontRef>
         </p:style>
       </p:cxnSp>
-      <p:cxnSp>
-        <p:nvCxnSpPr>
-          <p:cNvPr id="24" name="Straight Arrow Connector 23"/>
-          <p:cNvCxnSpPr>
-            <a:stCxn id="17" idx="3"/>
-            <a:endCxn id="14" idx="1"/>
-          </p:cNvCxnSpPr>
-          <p:nvPr/>
-        </p:nvCxnSpPr>
-        <p:spPr>
-          <a:xfrm flipV="1">
-            <a:off x="1828800" y="1085850"/>
-            <a:ext cx="609600" cy="1447800"/>
-          </a:xfrm>
-          <a:prstGeom prst="straightConnector1">
-            <a:avLst/>
-          </a:prstGeom>
-          <a:ln>
-            <a:tailEnd type="arrow"/>
-          </a:ln>
-        </p:spPr>
-        <p:style>
-          <a:lnRef idx="3">
-            <a:schemeClr val="accent6"/>
-          </a:lnRef>
-          <a:fillRef idx="0">
-            <a:schemeClr val="accent6"/>
-          </a:fillRef>
-          <a:effectRef idx="2">
-            <a:schemeClr val="accent6"/>
-          </a:effectRef>
-          <a:fontRef idx="minor">
-            <a:schemeClr val="tx1"/>
-          </a:fontRef>
-        </p:style>
-      </p:cxnSp>
       <p:sp>
         <p:nvSpPr>
           <p:cNvPr id="15" name="Rounded Rectangle 14"/>
@@ -5940,14 +5904,16 @@
         <p:nvCxnSpPr>
           <p:cNvPr id="28" name="Straight Arrow Connector 27"/>
           <p:cNvCxnSpPr>
-            <a:endCxn id="15" idx="1"/>
+            <a:cxnSpLocks/>
+            <a:stCxn id="15" idx="1"/>
+            <a:endCxn id="17" idx="3"/>
           </p:cNvCxnSpPr>
           <p:nvPr/>
         </p:nvCxnSpPr>
         <p:spPr>
-          <a:xfrm>
-            <a:off x="1828800" y="971550"/>
-            <a:ext cx="609600" cy="800100"/>
+          <a:xfrm flipH="1">
+            <a:off x="1828800" y="1771650"/>
+            <a:ext cx="609600" cy="762000"/>
           </a:xfrm>
           <a:prstGeom prst="straightConnector1">
             <a:avLst/>
@@ -10698,15 +10664,15 @@
           <p:cNvPr id="31" name="Straight Arrow Connector 30"/>
           <p:cNvCxnSpPr>
             <a:cxnSpLocks/>
-            <a:stCxn id="4" idx="3"/>
-            <a:endCxn id="10" idx="1"/>
+            <a:stCxn id="17" idx="1"/>
+            <a:endCxn id="5" idx="3"/>
           </p:cNvCxnSpPr>
           <p:nvPr/>
         </p:nvCxnSpPr>
         <p:spPr>
-          <a:xfrm flipV="1">
-            <a:off x="2310649" y="1009650"/>
-            <a:ext cx="889751" cy="228600"/>
+          <a:xfrm flipH="1">
+            <a:off x="2289837" y="2762387"/>
+            <a:ext cx="910563" cy="190363"/>
           </a:xfrm>
           <a:prstGeom prst="straightConnector1">
             <a:avLst/>
@@ -10875,14 +10841,15 @@
           </p:cNvPr>
           <p:cNvCxnSpPr>
             <a:cxnSpLocks/>
-            <a:stCxn id="15" idx="3"/>
+            <a:stCxn id="9" idx="1"/>
+            <a:endCxn id="17" idx="3"/>
           </p:cNvCxnSpPr>
           <p:nvPr/>
         </p:nvCxnSpPr>
         <p:spPr>
-          <a:xfrm>
-            <a:off x="5366344" y="1581150"/>
-            <a:ext cx="1183019" cy="533400"/>
+          <a:xfrm flipH="1" flipV="1">
+            <a:off x="5334000" y="2762387"/>
+            <a:ext cx="1143000" cy="69850"/>
           </a:xfrm>
           <a:prstGeom prst="straightConnector1">
             <a:avLst/>
@@ -10964,102 +10931,6 @@
           </a:p>
         </p:txBody>
       </p:sp>
-      <p:cxnSp>
-        <p:nvCxnSpPr>
-          <p:cNvPr id="21" name="Straight Arrow Connector 20">
-            <a:extLst>
-              <a:ext uri="{FF2B5EF4-FFF2-40B4-BE49-F238E27FC236}">
-                <a16:creationId xmlns:a16="http://schemas.microsoft.com/office/drawing/2014/main" id="{A3AB5405-6393-4EE4-8BE4-C362CFEF8815}"/>
-              </a:ext>
-            </a:extLst>
-          </p:cNvPr>
-          <p:cNvCxnSpPr>
-            <a:cxnSpLocks/>
-            <a:stCxn id="15" idx="3"/>
-            <a:endCxn id="9" idx="1"/>
-          </p:cNvCxnSpPr>
-          <p:nvPr/>
-        </p:nvCxnSpPr>
-        <p:spPr>
-          <a:xfrm>
-            <a:off x="5366344" y="1581150"/>
-            <a:ext cx="1110656" cy="1251087"/>
-          </a:xfrm>
-          <a:prstGeom prst="straightConnector1">
-            <a:avLst/>
-          </a:prstGeom>
-          <a:ln w="69850">
-            <a:solidFill>
-              <a:schemeClr val="accent6">
-                <a:lumMod val="75000"/>
-              </a:schemeClr>
-            </a:solidFill>
-            <a:tailEnd type="triangle"/>
-          </a:ln>
-        </p:spPr>
-        <p:style>
-          <a:lnRef idx="1">
-            <a:schemeClr val="accent1"/>
-          </a:lnRef>
-          <a:fillRef idx="0">
-            <a:schemeClr val="accent1"/>
-          </a:fillRef>
-          <a:effectRef idx="0">
-            <a:schemeClr val="accent1"/>
-          </a:effectRef>
-          <a:fontRef idx="minor">
-            <a:schemeClr val="tx1"/>
-          </a:fontRef>
-        </p:style>
-      </p:cxnSp>
-      <p:cxnSp>
-        <p:nvCxnSpPr>
-          <p:cNvPr id="33" name="Straight Arrow Connector 32">
-            <a:extLst>
-              <a:ext uri="{FF2B5EF4-FFF2-40B4-BE49-F238E27FC236}">
-                <a16:creationId xmlns:a16="http://schemas.microsoft.com/office/drawing/2014/main" id="{5AC1ED42-0862-47D0-9B6C-244BAAF9DB40}"/>
-              </a:ext>
-            </a:extLst>
-          </p:cNvPr>
-          <p:cNvCxnSpPr>
-            <a:cxnSpLocks/>
-            <a:stCxn id="15" idx="3"/>
-            <a:endCxn id="19" idx="1"/>
-          </p:cNvCxnSpPr>
-          <p:nvPr/>
-        </p:nvCxnSpPr>
-        <p:spPr>
-          <a:xfrm>
-            <a:off x="5366344" y="1581150"/>
-            <a:ext cx="1106819" cy="2057400"/>
-          </a:xfrm>
-          <a:prstGeom prst="straightConnector1">
-            <a:avLst/>
-          </a:prstGeom>
-          <a:ln w="69850">
-            <a:solidFill>
-              <a:schemeClr val="accent6">
-                <a:lumMod val="75000"/>
-              </a:schemeClr>
-            </a:solidFill>
-            <a:tailEnd type="triangle"/>
-          </a:ln>
-        </p:spPr>
-        <p:style>
-          <a:lnRef idx="1">
-            <a:schemeClr val="accent1"/>
-          </a:lnRef>
-          <a:fillRef idx="0">
-            <a:schemeClr val="accent1"/>
-          </a:fillRef>
-          <a:effectRef idx="0">
-            <a:schemeClr val="accent1"/>
-          </a:effectRef>
-          <a:fontRef idx="minor">
-            <a:schemeClr val="tx1"/>
-          </a:fontRef>
-        </p:style>
-      </p:cxnSp>
       <p:sp>
         <p:nvSpPr>
           <p:cNvPr id="11" name="TextBox 10">

</xml_diff>

<commit_message>
Added the code needed to get the chatGPT flyCamera to work
</commit_message>
<xml_diff>
--- a/Daily_Lectures/Day10 (textures, part 1)/INFO3111_S20_Day_10_Texture_mapping (code on last slide).pptx
+++ b/Daily_Lectures/Day10 (textures, part 1)/INFO3111_S20_Day_10_Texture_mapping (code on last slide).pptx
@@ -228,7 +228,7 @@
             <a:fld id="{6E28E25E-87BB-46EA-8F9E-473DAE89420C}" type="datetimeFigureOut">
               <a:rPr lang="en-CA" smtClean="0"/>
               <a:pPr/>
-              <a:t>2023-06-08</a:t>
+              <a:t>2023-06-09</a:t>
             </a:fld>
             <a:endParaRPr lang="en-CA"/>
           </a:p>
@@ -394,7 +394,7 @@
           <a:p>
             <a:fld id="{D61BC0C6-8165-4029-93EB-E0CF8A3883CE}" type="datetimeFigureOut">
               <a:rPr lang="en-CA" smtClean="0"/>
-              <a:t>2023-06-08</a:t>
+              <a:t>2023-06-09</a:t>
             </a:fld>
             <a:endParaRPr lang="en-CA"/>
           </a:p>
@@ -936,7 +936,7 @@
             <a:fld id="{667A62CB-8588-4D98-8E9E-C665A03A0EA4}" type="datetimeFigureOut">
               <a:rPr lang="en-CA" smtClean="0"/>
               <a:pPr/>
-              <a:t>2023-06-08</a:t>
+              <a:t>2023-06-09</a:t>
             </a:fld>
             <a:endParaRPr lang="en-CA"/>
           </a:p>
@@ -1103,7 +1103,7 @@
             <a:fld id="{667A62CB-8588-4D98-8E9E-C665A03A0EA4}" type="datetimeFigureOut">
               <a:rPr lang="en-CA" smtClean="0"/>
               <a:pPr/>
-              <a:t>2023-06-08</a:t>
+              <a:t>2023-06-09</a:t>
             </a:fld>
             <a:endParaRPr lang="en-CA"/>
           </a:p>
@@ -1280,7 +1280,7 @@
             <a:fld id="{667A62CB-8588-4D98-8E9E-C665A03A0EA4}" type="datetimeFigureOut">
               <a:rPr lang="en-CA" smtClean="0"/>
               <a:pPr/>
-              <a:t>2023-06-08</a:t>
+              <a:t>2023-06-09</a:t>
             </a:fld>
             <a:endParaRPr lang="en-CA"/>
           </a:p>
@@ -1447,7 +1447,7 @@
             <a:fld id="{667A62CB-8588-4D98-8E9E-C665A03A0EA4}" type="datetimeFigureOut">
               <a:rPr lang="en-CA" smtClean="0"/>
               <a:pPr/>
-              <a:t>2023-06-08</a:t>
+              <a:t>2023-06-09</a:t>
             </a:fld>
             <a:endParaRPr lang="en-CA"/>
           </a:p>
@@ -1690,7 +1690,7 @@
             <a:fld id="{667A62CB-8588-4D98-8E9E-C665A03A0EA4}" type="datetimeFigureOut">
               <a:rPr lang="en-CA" smtClean="0"/>
               <a:pPr/>
-              <a:t>2023-06-08</a:t>
+              <a:t>2023-06-09</a:t>
             </a:fld>
             <a:endParaRPr lang="en-CA"/>
           </a:p>
@@ -1975,7 +1975,7 @@
             <a:fld id="{667A62CB-8588-4D98-8E9E-C665A03A0EA4}" type="datetimeFigureOut">
               <a:rPr lang="en-CA" smtClean="0"/>
               <a:pPr/>
-              <a:t>2023-06-08</a:t>
+              <a:t>2023-06-09</a:t>
             </a:fld>
             <a:endParaRPr lang="en-CA"/>
           </a:p>
@@ -2394,7 +2394,7 @@
             <a:fld id="{667A62CB-8588-4D98-8E9E-C665A03A0EA4}" type="datetimeFigureOut">
               <a:rPr lang="en-CA" smtClean="0"/>
               <a:pPr/>
-              <a:t>2023-06-08</a:t>
+              <a:t>2023-06-09</a:t>
             </a:fld>
             <a:endParaRPr lang="en-CA"/>
           </a:p>
@@ -2509,7 +2509,7 @@
             <a:fld id="{667A62CB-8588-4D98-8E9E-C665A03A0EA4}" type="datetimeFigureOut">
               <a:rPr lang="en-CA" smtClean="0"/>
               <a:pPr/>
-              <a:t>2023-06-08</a:t>
+              <a:t>2023-06-09</a:t>
             </a:fld>
             <a:endParaRPr lang="en-CA"/>
           </a:p>
@@ -2601,7 +2601,7 @@
             <a:fld id="{667A62CB-8588-4D98-8E9E-C665A03A0EA4}" type="datetimeFigureOut">
               <a:rPr lang="en-CA" smtClean="0"/>
               <a:pPr/>
-              <a:t>2023-06-08</a:t>
+              <a:t>2023-06-09</a:t>
             </a:fld>
             <a:endParaRPr lang="en-CA"/>
           </a:p>
@@ -2875,7 +2875,7 @@
             <a:fld id="{667A62CB-8588-4D98-8E9E-C665A03A0EA4}" type="datetimeFigureOut">
               <a:rPr lang="en-CA" smtClean="0"/>
               <a:pPr/>
-              <a:t>2023-06-08</a:t>
+              <a:t>2023-06-09</a:t>
             </a:fld>
             <a:endParaRPr lang="en-CA"/>
           </a:p>
@@ -3125,7 +3125,7 @@
             <a:fld id="{667A62CB-8588-4D98-8E9E-C665A03A0EA4}" type="datetimeFigureOut">
               <a:rPr lang="en-CA" smtClean="0"/>
               <a:pPr/>
-              <a:t>2023-06-08</a:t>
+              <a:t>2023-06-09</a:t>
             </a:fld>
             <a:endParaRPr lang="en-CA"/>
           </a:p>
@@ -3335,7 +3335,7 @@
             <a:fld id="{667A62CB-8588-4D98-8E9E-C665A03A0EA4}" type="datetimeFigureOut">
               <a:rPr lang="en-CA" smtClean="0"/>
               <a:pPr/>
-              <a:t>2023-06-08</a:t>
+              <a:t>2023-06-09</a:t>
             </a:fld>
             <a:endParaRPr lang="en-CA"/>
           </a:p>
@@ -10664,15 +10664,15 @@
           <p:cNvPr id="31" name="Straight Arrow Connector 30"/>
           <p:cNvCxnSpPr>
             <a:cxnSpLocks/>
-            <a:stCxn id="17" idx="1"/>
+            <a:stCxn id="10" idx="1"/>
             <a:endCxn id="5" idx="3"/>
           </p:cNvCxnSpPr>
           <p:nvPr/>
         </p:nvCxnSpPr>
         <p:spPr>
           <a:xfrm flipH="1">
-            <a:off x="2289837" y="2762387"/>
-            <a:ext cx="910563" cy="190363"/>
+            <a:off x="2289837" y="1009650"/>
+            <a:ext cx="910563" cy="1943100"/>
           </a:xfrm>
           <a:prstGeom prst="straightConnector1">
             <a:avLst/>

</xml_diff>